<commit_message>
weiß nicht was ich geändert habe
</commit_message>
<xml_diff>
--- a/misc/Graphiken.pptx
+++ b/misc/Graphiken.pptx
@@ -3572,7 +3572,7 @@
       </p:grpSpPr>
       <p:grpSp>
         <p:nvGrpSpPr>
-          <p:cNvPr id="33" name="Gruppieren 32"/>
+          <p:cNvPr id="34" name="Gruppieren 33"/>
           <p:cNvGrpSpPr/>
           <p:nvPr/>
         </p:nvGrpSpPr>
@@ -3648,7 +3648,7 @@
                     <a:schemeClr val="tx1"/>
                   </a:solidFill>
                 </a:rPr>
-                <a:t>Calculation</a:t>
+                <a:t>CalculationFacade</a:t>
               </a:r>
               <a:endParaRPr lang="de-DE" b="1" dirty="0">
                 <a:solidFill>
@@ -3722,7 +3722,7 @@
                     <a:schemeClr val="tx1"/>
                   </a:solidFill>
                 </a:rPr>
-                <a:t>ImportExport</a:t>
+                <a:t>ImportExportFacade</a:t>
               </a:r>
               <a:endParaRPr lang="de-DE" sz="2000" b="1" dirty="0">
                 <a:solidFill>

</xml_diff>